<commit_message>
updating readme for the first time
</commit_message>
<xml_diff>
--- a/presentation/MikeYung_Presentation_final.pptx
+++ b/presentation/MikeYung_Presentation_final.pptx
@@ -1359,11 +1359,7 @@
             </a:pPr>
             <a:r>
               <a:rPr lang="en-US" baseline="0" dirty="0" smtClean="0"/>
-              <a:t>Now I want to switch gears and dive deep into the essay portion</a:t>
-            </a:r>
-            <a:r>
-              <a:rPr lang="en-US" baseline="0" dirty="0" smtClean="0"/>
-              <a:t>.</a:t>
+              <a:t>Now I want to switch gears and dive deep into the essay portion.</a:t>
             </a:r>
             <a:r>
               <a:rPr lang="en-US" sz="1200" dirty="0" smtClean="0">
@@ -5279,22 +5275,20 @@
         </p:nvSpPr>
         <p:spPr>
           <a:xfrm>
-            <a:off x="685800" y="2271535"/>
+            <a:off x="685800" y="2045756"/>
             <a:ext cx="7772400" cy="1470025"/>
           </a:xfrm>
         </p:spPr>
         <p:txBody>
-          <a:bodyPr/>
+          <a:bodyPr>
+            <a:normAutofit/>
+          </a:bodyPr>
           <a:lstStyle/>
           <a:p>
             <a:pPr algn="l"/>
             <a:r>
-              <a:rPr lang="en-US" b="1" dirty="0" err="1" smtClean="0"/>
-              <a:t>AdmitSee</a:t>
-            </a:r>
-            <a:r>
               <a:rPr lang="en-US" b="1" dirty="0" smtClean="0"/>
-              <a:t> Analytics</a:t>
+              <a:t>Mining the Common App</a:t>
             </a:r>
             <a:endParaRPr lang="en-US" b="1" dirty="0"/>
           </a:p>
@@ -5312,17 +5306,19 @@
         </p:nvSpPr>
         <p:spPr>
           <a:xfrm>
-            <a:off x="685800" y="3566935"/>
+            <a:off x="685800" y="3554935"/>
             <a:ext cx="6400800" cy="812800"/>
           </a:xfrm>
         </p:spPr>
         <p:txBody>
-          <a:bodyPr/>
+          <a:bodyPr>
+            <a:normAutofit fontScale="92500" lnSpcReduction="20000"/>
+          </a:bodyPr>
           <a:lstStyle/>
           <a:p>
             <a:pPr algn="l"/>
             <a:r>
-              <a:rPr lang="en-US" dirty="0" smtClean="0">
+              <a:rPr lang="en-US" sz="3500" dirty="0" smtClean="0">
                 <a:solidFill>
                   <a:schemeClr val="tx1">
                     <a:lumMod val="65000"/>
@@ -5330,9 +5326,45 @@
                   </a:schemeClr>
                 </a:solidFill>
               </a:rPr>
-              <a:t>Mike Yung</a:t>
-            </a:r>
-            <a:endParaRPr lang="en-US" dirty="0">
+              <a:t>Mike </a:t>
+            </a:r>
+            <a:r>
+              <a:rPr lang="en-US" sz="3500" dirty="0" smtClean="0">
+                <a:solidFill>
+                  <a:schemeClr val="tx1">
+                    <a:lumMod val="65000"/>
+                    <a:lumOff val="35000"/>
+                  </a:schemeClr>
+                </a:solidFill>
+              </a:rPr>
+              <a:t>Yung</a:t>
+            </a:r>
+          </a:p>
+          <a:p>
+            <a:pPr algn="l"/>
+            <a:r>
+              <a:rPr lang="en-US" sz="2200" i="1" dirty="0" smtClean="0">
+                <a:solidFill>
+                  <a:schemeClr val="tx1">
+                    <a:lumMod val="65000"/>
+                    <a:lumOff val="35000"/>
+                  </a:schemeClr>
+                </a:solidFill>
+              </a:rPr>
+              <a:t>in partnership with </a:t>
+            </a:r>
+            <a:r>
+              <a:rPr lang="en-US" sz="2200" i="1" dirty="0" err="1" smtClean="0">
+                <a:solidFill>
+                  <a:schemeClr val="tx1">
+                    <a:lumMod val="65000"/>
+                    <a:lumOff val="35000"/>
+                  </a:schemeClr>
+                </a:solidFill>
+              </a:rPr>
+              <a:t>AdmitSee</a:t>
+            </a:r>
+            <a:endParaRPr lang="en-US" sz="2200" i="1" dirty="0">
               <a:solidFill>
                 <a:schemeClr val="tx1">
                   <a:lumMod val="65000"/>

</xml_diff>